<commit_message>
test script for zero epoch fitting.
</commit_message>
<xml_diff>
--- a/Summary/20220105_microbiome_demographic_slides.pptx
+++ b/Summary/20220105_microbiome_demographic_slides.pptx
@@ -157,10 +157,25 @@
   <pc:docChgLst>
     <pc:chgData name="Jonathan Mah" userId="5261b2f2f3e51194" providerId="LiveId" clId="{7DE022A1-D0E3-408A-81F5-4F35AC1E0B2D}"/>
     <pc:docChg chg="undo custSel addSld delSld modSld sldOrd modSection">
-      <pc:chgData name="Jonathan Mah" userId="5261b2f2f3e51194" providerId="LiveId" clId="{7DE022A1-D0E3-408A-81F5-4F35AC1E0B2D}" dt="2022-01-06T03:55:16.190" v="1137" actId="20577"/>
+      <pc:chgData name="Jonathan Mah" userId="5261b2f2f3e51194" providerId="LiveId" clId="{7DE022A1-D0E3-408A-81F5-4F35AC1E0B2D}" dt="2022-01-24T19:11:24.641" v="1145" actId="20577"/>
       <pc:docMkLst>
         <pc:docMk/>
       </pc:docMkLst>
+      <pc:sldChg chg="modSp mod">
+        <pc:chgData name="Jonathan Mah" userId="5261b2f2f3e51194" providerId="LiveId" clId="{7DE022A1-D0E3-408A-81F5-4F35AC1E0B2D}" dt="2022-01-24T19:11:24.641" v="1145" actId="20577"/>
+        <pc:sldMkLst>
+          <pc:docMk/>
+          <pc:sldMk cId="1442538198" sldId="256"/>
+        </pc:sldMkLst>
+        <pc:spChg chg="mod">
+          <ac:chgData name="Jonathan Mah" userId="5261b2f2f3e51194" providerId="LiveId" clId="{7DE022A1-D0E3-408A-81F5-4F35AC1E0B2D}" dt="2022-01-24T19:11:24.641" v="1145" actId="20577"/>
+          <ac:spMkLst>
+            <pc:docMk/>
+            <pc:sldMk cId="1442538198" sldId="256"/>
+            <ac:spMk id="3" creationId="{D712BDE3-5450-4B18-B90B-D71DD9D5BAC2}"/>
+          </ac:spMkLst>
+        </pc:spChg>
+      </pc:sldChg>
       <pc:sldChg chg="modSp mod">
         <pc:chgData name="Jonathan Mah" userId="5261b2f2f3e51194" providerId="LiveId" clId="{7DE022A1-D0E3-408A-81F5-4F35AC1E0B2D}" dt="2022-01-06T03:25:23.219" v="874" actId="6549"/>
         <pc:sldMkLst>
@@ -1495,7 +1510,7 @@
           <a:p>
             <a:fld id="{2F446724-7A58-4020-9182-8374F0305DD3}" type="datetimeFigureOut">
               <a:rPr lang="en-US" smtClean="0"/>
-              <a:t>1/5/2022</a:t>
+              <a:t>1/24/2022</a:t>
             </a:fld>
             <a:endParaRPr lang="en-US"/>
           </a:p>
@@ -2306,7 +2321,7 @@
           <a:p>
             <a:fld id="{6A6E4237-9E27-40CF-A4D8-1330F92F21DA}" type="datetimeFigureOut">
               <a:rPr lang="en-US" smtClean="0"/>
-              <a:t>1/5/2022</a:t>
+              <a:t>1/24/2022</a:t>
             </a:fld>
             <a:endParaRPr lang="en-US"/>
           </a:p>
@@ -2504,7 +2519,7 @@
           <a:p>
             <a:fld id="{6A6E4237-9E27-40CF-A4D8-1330F92F21DA}" type="datetimeFigureOut">
               <a:rPr lang="en-US" smtClean="0"/>
-              <a:t>1/5/2022</a:t>
+              <a:t>1/24/2022</a:t>
             </a:fld>
             <a:endParaRPr lang="en-US"/>
           </a:p>
@@ -2712,7 +2727,7 @@
           <a:p>
             <a:fld id="{6A6E4237-9E27-40CF-A4D8-1330F92F21DA}" type="datetimeFigureOut">
               <a:rPr lang="en-US" smtClean="0"/>
-              <a:t>1/5/2022</a:t>
+              <a:t>1/24/2022</a:t>
             </a:fld>
             <a:endParaRPr lang="en-US"/>
           </a:p>
@@ -2910,7 +2925,7 @@
           <a:p>
             <a:fld id="{6A6E4237-9E27-40CF-A4D8-1330F92F21DA}" type="datetimeFigureOut">
               <a:rPr lang="en-US" smtClean="0"/>
-              <a:t>1/5/2022</a:t>
+              <a:t>1/24/2022</a:t>
             </a:fld>
             <a:endParaRPr lang="en-US"/>
           </a:p>
@@ -3185,7 +3200,7 @@
           <a:p>
             <a:fld id="{6A6E4237-9E27-40CF-A4D8-1330F92F21DA}" type="datetimeFigureOut">
               <a:rPr lang="en-US" smtClean="0"/>
-              <a:t>1/5/2022</a:t>
+              <a:t>1/24/2022</a:t>
             </a:fld>
             <a:endParaRPr lang="en-US"/>
           </a:p>
@@ -3450,7 +3465,7 @@
           <a:p>
             <a:fld id="{6A6E4237-9E27-40CF-A4D8-1330F92F21DA}" type="datetimeFigureOut">
               <a:rPr lang="en-US" smtClean="0"/>
-              <a:t>1/5/2022</a:t>
+              <a:t>1/24/2022</a:t>
             </a:fld>
             <a:endParaRPr lang="en-US"/>
           </a:p>
@@ -3862,7 +3877,7 @@
           <a:p>
             <a:fld id="{6A6E4237-9E27-40CF-A4D8-1330F92F21DA}" type="datetimeFigureOut">
               <a:rPr lang="en-US" smtClean="0"/>
-              <a:t>1/5/2022</a:t>
+              <a:t>1/24/2022</a:t>
             </a:fld>
             <a:endParaRPr lang="en-US"/>
           </a:p>
@@ -4003,7 +4018,7 @@
           <a:p>
             <a:fld id="{6A6E4237-9E27-40CF-A4D8-1330F92F21DA}" type="datetimeFigureOut">
               <a:rPr lang="en-US" smtClean="0"/>
-              <a:t>1/5/2022</a:t>
+              <a:t>1/24/2022</a:t>
             </a:fld>
             <a:endParaRPr lang="en-US"/>
           </a:p>
@@ -4116,7 +4131,7 @@
           <a:p>
             <a:fld id="{6A6E4237-9E27-40CF-A4D8-1330F92F21DA}" type="datetimeFigureOut">
               <a:rPr lang="en-US" smtClean="0"/>
-              <a:t>1/5/2022</a:t>
+              <a:t>1/24/2022</a:t>
             </a:fld>
             <a:endParaRPr lang="en-US"/>
           </a:p>
@@ -4427,7 +4442,7 @@
           <a:p>
             <a:fld id="{6A6E4237-9E27-40CF-A4D8-1330F92F21DA}" type="datetimeFigureOut">
               <a:rPr lang="en-US" smtClean="0"/>
-              <a:t>1/5/2022</a:t>
+              <a:t>1/24/2022</a:t>
             </a:fld>
             <a:endParaRPr lang="en-US"/>
           </a:p>
@@ -4715,7 +4730,7 @@
           <a:p>
             <a:fld id="{6A6E4237-9E27-40CF-A4D8-1330F92F21DA}" type="datetimeFigureOut">
               <a:rPr lang="en-US" smtClean="0"/>
-              <a:t>1/5/2022</a:t>
+              <a:t>1/24/2022</a:t>
             </a:fld>
             <a:endParaRPr lang="en-US"/>
           </a:p>
@@ -4956,7 +4971,7 @@
           <a:p>
             <a:fld id="{6A6E4237-9E27-40CF-A4D8-1330F92F21DA}" type="datetimeFigureOut">
               <a:rPr lang="en-US" smtClean="0"/>
-              <a:t>1/5/2022</a:t>
+              <a:t>1/24/2022</a:t>
             </a:fld>
             <a:endParaRPr lang="en-US"/>
           </a:p>
@@ -5441,7 +5456,7 @@
           <a:lstStyle/>
           <a:p>
             <a:r>
-              <a:rPr lang="en-US">
+              <a:rPr lang="en-US" dirty="0">
                 <a:solidFill>
                   <a:schemeClr val="tx1">
                     <a:lumMod val="50000"/>
@@ -5451,12 +5466,12 @@
                 <a:latin typeface="Yu Gothic" panose="020B0400000000000000" pitchFamily="34" charset="-128"/>
                 <a:ea typeface="Yu Gothic" panose="020B0400000000000000" pitchFamily="34" charset="-128"/>
               </a:rPr>
-              <a:t>20211208</a:t>
-            </a:r>
-          </a:p>
-          <a:p>
-            <a:r>
-              <a:rPr lang="en-US">
+              <a:t>20220124</a:t>
+            </a:r>
+          </a:p>
+          <a:p>
+            <a:r>
+              <a:rPr lang="en-US" dirty="0">
                 <a:solidFill>
                   <a:schemeClr val="tx1">
                     <a:lumMod val="50000"/>
@@ -5471,7 +5486,7 @@
           </a:p>
           <a:p>
             <a:r>
-              <a:rPr lang="en-US">
+              <a:rPr lang="en-US" dirty="0">
                 <a:solidFill>
                   <a:schemeClr val="tx1">
                     <a:lumMod val="50000"/>
@@ -7241,8 +7256,8 @@
             <a:chExt cx="231840" cy="1946160"/>
           </a:xfrm>
         </p:grpSpPr>
-        <mc:AlternateContent xmlns:mc="http://schemas.openxmlformats.org/markup-compatibility/2006">
-          <mc:Choice xmlns:p14="http://schemas.microsoft.com/office/powerpoint/2010/main" Requires="p14">
+        <mc:AlternateContent xmlns:mc="http://schemas.openxmlformats.org/markup-compatibility/2006" xmlns:p14="http://schemas.microsoft.com/office/powerpoint/2010/main">
+          <mc:Choice Requires="p14">
             <p:contentPart p14:bwMode="auto" r:id="rId3">
               <p14:nvContentPartPr>
                 <p14:cNvPr id="7" name="Ink 6">
@@ -7261,7 +7276,7 @@
               </p14:xfrm>
             </p:contentPart>
           </mc:Choice>
-          <mc:Fallback>
+          <mc:Fallback xmlns="">
             <p:pic>
               <p:nvPicPr>
                 <p:cNvPr id="7" name="Ink 6">
@@ -7292,8 +7307,8 @@
             </p:pic>
           </mc:Fallback>
         </mc:AlternateContent>
-        <mc:AlternateContent xmlns:mc="http://schemas.openxmlformats.org/markup-compatibility/2006">
-          <mc:Choice xmlns:p14="http://schemas.microsoft.com/office/powerpoint/2010/main" Requires="p14">
+        <mc:AlternateContent xmlns:mc="http://schemas.openxmlformats.org/markup-compatibility/2006" xmlns:p14="http://schemas.microsoft.com/office/powerpoint/2010/main">
+          <mc:Choice Requires="p14">
             <p:contentPart p14:bwMode="auto" r:id="rId5">
               <p14:nvContentPartPr>
                 <p14:cNvPr id="8" name="Ink 7">
@@ -7312,7 +7327,7 @@
               </p14:xfrm>
             </p:contentPart>
           </mc:Choice>
-          <mc:Fallback>
+          <mc:Fallback xmlns="">
             <p:pic>
               <p:nvPicPr>
                 <p:cNvPr id="8" name="Ink 7">
@@ -7343,8 +7358,8 @@
             </p:pic>
           </mc:Fallback>
         </mc:AlternateContent>
-        <mc:AlternateContent xmlns:mc="http://schemas.openxmlformats.org/markup-compatibility/2006">
-          <mc:Choice xmlns:p14="http://schemas.microsoft.com/office/powerpoint/2010/main" Requires="p14">
+        <mc:AlternateContent xmlns:mc="http://schemas.openxmlformats.org/markup-compatibility/2006" xmlns:p14="http://schemas.microsoft.com/office/powerpoint/2010/main">
+          <mc:Choice Requires="p14">
             <p:contentPart p14:bwMode="auto" r:id="rId7">
               <p14:nvContentPartPr>
                 <p14:cNvPr id="11" name="Ink 10">
@@ -7363,7 +7378,7 @@
               </p14:xfrm>
             </p:contentPart>
           </mc:Choice>
-          <mc:Fallback>
+          <mc:Fallback xmlns="">
             <p:pic>
               <p:nvPicPr>
                 <p:cNvPr id="11" name="Ink 10">
@@ -7394,8 +7409,8 @@
             </p:pic>
           </mc:Fallback>
         </mc:AlternateContent>
-        <mc:AlternateContent xmlns:mc="http://schemas.openxmlformats.org/markup-compatibility/2006">
-          <mc:Choice xmlns:p14="http://schemas.microsoft.com/office/powerpoint/2010/main" Requires="p14">
+        <mc:AlternateContent xmlns:mc="http://schemas.openxmlformats.org/markup-compatibility/2006" xmlns:p14="http://schemas.microsoft.com/office/powerpoint/2010/main">
+          <mc:Choice Requires="p14">
             <p:contentPart p14:bwMode="auto" r:id="rId9">
               <p14:nvContentPartPr>
                 <p14:cNvPr id="16" name="Ink 15">
@@ -7414,7 +7429,7 @@
               </p14:xfrm>
             </p:contentPart>
           </mc:Choice>
-          <mc:Fallback>
+          <mc:Fallback xmlns="">
             <p:pic>
               <p:nvPicPr>
                 <p:cNvPr id="16" name="Ink 15">
@@ -7445,8 +7460,8 @@
             </p:pic>
           </mc:Fallback>
         </mc:AlternateContent>
-        <mc:AlternateContent xmlns:mc="http://schemas.openxmlformats.org/markup-compatibility/2006">
-          <mc:Choice xmlns:p14="http://schemas.microsoft.com/office/powerpoint/2010/main" Requires="p14">
+        <mc:AlternateContent xmlns:mc="http://schemas.openxmlformats.org/markup-compatibility/2006" xmlns:p14="http://schemas.microsoft.com/office/powerpoint/2010/main">
+          <mc:Choice Requires="p14">
             <p:contentPart p14:bwMode="auto" r:id="rId11">
               <p14:nvContentPartPr>
                 <p14:cNvPr id="17" name="Ink 16">
@@ -7465,7 +7480,7 @@
               </p14:xfrm>
             </p:contentPart>
           </mc:Choice>
-          <mc:Fallback>
+          <mc:Fallback xmlns="">
             <p:pic>
               <p:nvPicPr>
                 <p:cNvPr id="17" name="Ink 16">
@@ -7497,8 +7512,8 @@
           </mc:Fallback>
         </mc:AlternateContent>
       </p:grpSp>
-      <mc:AlternateContent xmlns:mc="http://schemas.openxmlformats.org/markup-compatibility/2006">
-        <mc:Choice xmlns:p14="http://schemas.microsoft.com/office/powerpoint/2010/main" Requires="p14">
+      <mc:AlternateContent xmlns:mc="http://schemas.openxmlformats.org/markup-compatibility/2006" xmlns:p14="http://schemas.microsoft.com/office/powerpoint/2010/main">
+        <mc:Choice Requires="p14">
           <p:contentPart p14:bwMode="auto" r:id="rId13">
             <p14:nvContentPartPr>
               <p14:cNvPr id="19" name="Ink 18">
@@ -7517,7 +7532,7 @@
             </p14:xfrm>
           </p:contentPart>
         </mc:Choice>
-        <mc:Fallback>
+        <mc:Fallback xmlns="">
           <p:pic>
             <p:nvPicPr>
               <p:cNvPr id="19" name="Ink 18">
@@ -7568,8 +7583,8 @@
             <a:chExt cx="759960" cy="1903320"/>
           </a:xfrm>
         </p:grpSpPr>
-        <mc:AlternateContent xmlns:mc="http://schemas.openxmlformats.org/markup-compatibility/2006">
-          <mc:Choice xmlns:p14="http://schemas.microsoft.com/office/powerpoint/2010/main" Requires="p14">
+        <mc:AlternateContent xmlns:mc="http://schemas.openxmlformats.org/markup-compatibility/2006" xmlns:p14="http://schemas.microsoft.com/office/powerpoint/2010/main">
+          <mc:Choice Requires="p14">
             <p:contentPart p14:bwMode="auto" r:id="rId15">
               <p14:nvContentPartPr>
                 <p14:cNvPr id="5" name="Ink 4">
@@ -7588,7 +7603,7 @@
               </p14:xfrm>
             </p:contentPart>
           </mc:Choice>
-          <mc:Fallback>
+          <mc:Fallback xmlns="">
             <p:pic>
               <p:nvPicPr>
                 <p:cNvPr id="5" name="Ink 4">
@@ -7619,8 +7634,8 @@
             </p:pic>
           </mc:Fallback>
         </mc:AlternateContent>
-        <mc:AlternateContent xmlns:mc="http://schemas.openxmlformats.org/markup-compatibility/2006">
-          <mc:Choice xmlns:p14="http://schemas.microsoft.com/office/powerpoint/2010/main" Requires="p14">
+        <mc:AlternateContent xmlns:mc="http://schemas.openxmlformats.org/markup-compatibility/2006" xmlns:p14="http://schemas.microsoft.com/office/powerpoint/2010/main">
+          <mc:Choice Requires="p14">
             <p:contentPart p14:bwMode="auto" r:id="rId17">
               <p14:nvContentPartPr>
                 <p14:cNvPr id="9" name="Ink 8">
@@ -7639,7 +7654,7 @@
               </p14:xfrm>
             </p:contentPart>
           </mc:Choice>
-          <mc:Fallback>
+          <mc:Fallback xmlns="">
             <p:pic>
               <p:nvPicPr>
                 <p:cNvPr id="9" name="Ink 8">
@@ -7670,8 +7685,8 @@
             </p:pic>
           </mc:Fallback>
         </mc:AlternateContent>
-        <mc:AlternateContent xmlns:mc="http://schemas.openxmlformats.org/markup-compatibility/2006">
-          <mc:Choice xmlns:p14="http://schemas.microsoft.com/office/powerpoint/2010/main" Requires="p14">
+        <mc:AlternateContent xmlns:mc="http://schemas.openxmlformats.org/markup-compatibility/2006" xmlns:p14="http://schemas.microsoft.com/office/powerpoint/2010/main">
+          <mc:Choice Requires="p14">
             <p:contentPart p14:bwMode="auto" r:id="rId19">
               <p14:nvContentPartPr>
                 <p14:cNvPr id="10" name="Ink 9">
@@ -7690,7 +7705,7 @@
               </p14:xfrm>
             </p:contentPart>
           </mc:Choice>
-          <mc:Fallback>
+          <mc:Fallback xmlns="">
             <p:pic>
               <p:nvPicPr>
                 <p:cNvPr id="10" name="Ink 9">
@@ -7721,8 +7736,8 @@
             </p:pic>
           </mc:Fallback>
         </mc:AlternateContent>
-        <mc:AlternateContent xmlns:mc="http://schemas.openxmlformats.org/markup-compatibility/2006">
-          <mc:Choice xmlns:p14="http://schemas.microsoft.com/office/powerpoint/2010/main" Requires="p14">
+        <mc:AlternateContent xmlns:mc="http://schemas.openxmlformats.org/markup-compatibility/2006" xmlns:p14="http://schemas.microsoft.com/office/powerpoint/2010/main">
+          <mc:Choice Requires="p14">
             <p:contentPart p14:bwMode="auto" r:id="rId21">
               <p14:nvContentPartPr>
                 <p14:cNvPr id="14" name="Ink 13">
@@ -7741,7 +7756,7 @@
               </p14:xfrm>
             </p:contentPart>
           </mc:Choice>
-          <mc:Fallback>
+          <mc:Fallback xmlns="">
             <p:pic>
               <p:nvPicPr>
                 <p:cNvPr id="14" name="Ink 13">
@@ -7772,8 +7787,8 @@
             </p:pic>
           </mc:Fallback>
         </mc:AlternateContent>
-        <mc:AlternateContent xmlns:mc="http://schemas.openxmlformats.org/markup-compatibility/2006">
-          <mc:Choice xmlns:p14="http://schemas.microsoft.com/office/powerpoint/2010/main" Requires="p14">
+        <mc:AlternateContent xmlns:mc="http://schemas.openxmlformats.org/markup-compatibility/2006" xmlns:p14="http://schemas.microsoft.com/office/powerpoint/2010/main">
+          <mc:Choice Requires="p14">
             <p:contentPart p14:bwMode="auto" r:id="rId23">
               <p14:nvContentPartPr>
                 <p14:cNvPr id="24" name="Ink 23">
@@ -7792,7 +7807,7 @@
               </p14:xfrm>
             </p:contentPart>
           </mc:Choice>
-          <mc:Fallback>
+          <mc:Fallback xmlns="">
             <p:pic>
               <p:nvPicPr>
                 <p:cNvPr id="24" name="Ink 23">

</xml_diff>